<commit_message>
small fix in perfect secrecy thm1.1
</commit_message>
<xml_diff>
--- a/Lectures/Lecture1.pptx
+++ b/Lectures/Lecture1.pptx
@@ -343,7 +343,7 @@
           <a:p>
             <a:fld id="{CBA08D16-15DC-4E25-BDC3-F25146157B16}" type="datetimeFigureOut">
               <a:rPr lang="ru-RU" smtClean="0"/>
-              <a:t>31.08.2020</a:t>
+              <a:t>03.09.2020</a:t>
             </a:fld>
             <a:endParaRPr lang="ru-RU"/>
           </a:p>
@@ -826,7 +826,7 @@
           <a:p>
             <a:fld id="{FCEC8293-DB51-454A-BE81-EC8FCB31EBA2}" type="datetime1">
               <a:rPr lang="ru-RU" smtClean="0"/>
-              <a:t>31.08.2020</a:t>
+              <a:t>03.09.2020</a:t>
             </a:fld>
             <a:endParaRPr lang="ru-RU"/>
           </a:p>
@@ -1000,7 +1000,7 @@
           <a:p>
             <a:fld id="{241C87B1-1C35-4DBD-BC18-2BC72E776603}" type="datetime1">
               <a:rPr lang="ru-RU" smtClean="0"/>
-              <a:t>31.08.2020</a:t>
+              <a:t>03.09.2020</a:t>
             </a:fld>
             <a:endParaRPr lang="ru-RU"/>
           </a:p>
@@ -1184,7 +1184,7 @@
           <a:p>
             <a:fld id="{3134C275-26C0-42CD-9111-9ADE65922AF9}" type="datetime1">
               <a:rPr lang="ru-RU" smtClean="0"/>
-              <a:t>31.08.2020</a:t>
+              <a:t>03.09.2020</a:t>
             </a:fld>
             <a:endParaRPr lang="ru-RU"/>
           </a:p>
@@ -1358,7 +1358,7 @@
           <a:p>
             <a:fld id="{C1A9A50B-C350-45F5-8AAB-ADB9E670AF2E}" type="datetime1">
               <a:rPr lang="ru-RU" smtClean="0"/>
-              <a:t>31.08.2020</a:t>
+              <a:t>03.09.2020</a:t>
             </a:fld>
             <a:endParaRPr lang="ru-RU"/>
           </a:p>
@@ -1608,7 +1608,7 @@
           <a:p>
             <a:fld id="{089688C9-348F-42F9-B6C0-5990DDE0C5B2}" type="datetime1">
               <a:rPr lang="ru-RU" smtClean="0"/>
-              <a:t>31.08.2020</a:t>
+              <a:t>03.09.2020</a:t>
             </a:fld>
             <a:endParaRPr lang="ru-RU"/>
           </a:p>
@@ -1844,7 +1844,7 @@
           <a:p>
             <a:fld id="{684AFD8F-6DD9-4AD3-A505-FDC3F5C5F3F6}" type="datetime1">
               <a:rPr lang="ru-RU" smtClean="0"/>
-              <a:t>31.08.2020</a:t>
+              <a:t>03.09.2020</a:t>
             </a:fld>
             <a:endParaRPr lang="ru-RU"/>
           </a:p>
@@ -2215,7 +2215,7 @@
           <a:p>
             <a:fld id="{63551EFE-4D02-45EB-A747-8B6F047B5AA0}" type="datetime1">
               <a:rPr lang="ru-RU" smtClean="0"/>
-              <a:t>31.08.2020</a:t>
+              <a:t>03.09.2020</a:t>
             </a:fld>
             <a:endParaRPr lang="ru-RU"/>
           </a:p>
@@ -2337,7 +2337,7 @@
           <a:p>
             <a:fld id="{813A9F34-E5CD-4B8F-AA9E-889C84372B20}" type="datetime1">
               <a:rPr lang="ru-RU" smtClean="0"/>
-              <a:t>31.08.2020</a:t>
+              <a:t>03.09.2020</a:t>
             </a:fld>
             <a:endParaRPr lang="ru-RU"/>
           </a:p>
@@ -2436,7 +2436,7 @@
           <a:p>
             <a:fld id="{51224D22-9B29-44A6-8E82-95FC492DEDC1}" type="datetime1">
               <a:rPr lang="ru-RU" smtClean="0"/>
-              <a:t>31.08.2020</a:t>
+              <a:t>03.09.2020</a:t>
             </a:fld>
             <a:endParaRPr lang="ru-RU"/>
           </a:p>
@@ -2717,7 +2717,7 @@
           <a:p>
             <a:fld id="{91D1034F-4441-48A1-BDC0-25EA1022324A}" type="datetime1">
               <a:rPr lang="ru-RU" smtClean="0"/>
-              <a:t>31.08.2020</a:t>
+              <a:t>03.09.2020</a:t>
             </a:fld>
             <a:endParaRPr lang="ru-RU"/>
           </a:p>
@@ -2974,7 +2974,7 @@
           <a:p>
             <a:fld id="{B0FFDE79-B627-473B-AE17-4C65BD2495F7}" type="datetime1">
               <a:rPr lang="ru-RU" smtClean="0"/>
-              <a:t>31.08.2020</a:t>
+              <a:t>03.09.2020</a:t>
             </a:fld>
             <a:endParaRPr lang="ru-RU"/>
           </a:p>
@@ -3191,7 +3191,7 @@
           <a:p>
             <a:fld id="{11CA537A-1B8C-47BA-9BA6-7CE3FAFDA8BE}" type="datetime1">
               <a:rPr lang="ru-RU" smtClean="0"/>
-              <a:t>31.08.2020</a:t>
+              <a:t>03.09.2020</a:t>
             </a:fld>
             <a:endParaRPr lang="ru-RU"/>
           </a:p>
@@ -17512,8 +17512,8 @@
           </a:prstGeom>
         </p:spPr>
       </p:pic>
-      <mc:AlternateContent xmlns:mc="http://schemas.openxmlformats.org/markup-compatibility/2006">
-        <mc:Choice xmlns:a14="http://schemas.microsoft.com/office/drawing/2010/main" Requires="a14">
+      <mc:AlternateContent xmlns:mc="http://schemas.openxmlformats.org/markup-compatibility/2006" xmlns:a14="http://schemas.microsoft.com/office/drawing/2010/main">
+        <mc:Choice Requires="a14">
           <p:sp>
             <p:nvSpPr>
               <p:cNvPr id="6" name="TextBox 5"/>
@@ -17583,7 +17583,7 @@
             </p:txBody>
           </p:sp>
         </mc:Choice>
-        <mc:Fallback>
+        <mc:Fallback xmlns="">
           <p:sp>
             <p:nvSpPr>
               <p:cNvPr id="6" name="TextBox 5"/>
@@ -17745,8 +17745,8 @@
           </a:prstGeom>
         </p:spPr>
       </p:pic>
-      <mc:AlternateContent xmlns:mc="http://schemas.openxmlformats.org/markup-compatibility/2006">
-        <mc:Choice xmlns:a14="http://schemas.microsoft.com/office/drawing/2010/main" Requires="a14">
+      <mc:AlternateContent xmlns:mc="http://schemas.openxmlformats.org/markup-compatibility/2006" xmlns:a14="http://schemas.microsoft.com/office/drawing/2010/main">
+        <mc:Choice Requires="a14">
           <p:sp>
             <p:nvSpPr>
               <p:cNvPr id="10" name="TextBox 9"/>
@@ -17817,7 +17817,7 @@
             </p:txBody>
           </p:sp>
         </mc:Choice>
-        <mc:Fallback>
+        <mc:Fallback xmlns="">
           <p:sp>
             <p:nvSpPr>
               <p:cNvPr id="10" name="TextBox 9"/>
@@ -20254,8 +20254,8 @@
           </a:p>
         </p:txBody>
       </p:sp>
-      <mc:AlternateContent xmlns:mc="http://schemas.openxmlformats.org/markup-compatibility/2006" xmlns:a14="http://schemas.microsoft.com/office/drawing/2010/main">
-        <mc:Choice Requires="a14">
+      <mc:AlternateContent xmlns:mc="http://schemas.openxmlformats.org/markup-compatibility/2006">
+        <mc:Choice xmlns:a14="http://schemas.microsoft.com/office/drawing/2010/main" Requires="a14">
           <p:sp>
             <p:nvSpPr>
               <p:cNvPr id="3" name="Объект 2"/>
@@ -20811,7 +20811,13 @@
                       <a:rPr lang="en-US" i="1">
                         <a:latin typeface="Cambria Math" panose="02040503050406030204" pitchFamily="18" charset="0"/>
                       </a:rPr>
-                      <m:t>⇒</m:t>
+                      <m:t>&lt;</m:t>
+                    </m:r>
+                    <m:r>
+                      <a:rPr lang="en-US" b="0" i="1" smtClean="0">
+                        <a:latin typeface="Cambria Math" panose="02040503050406030204" pitchFamily="18" charset="0"/>
+                      </a:rPr>
+                      <m:t> = &gt;</m:t>
                     </m:r>
                     <m:d>
                       <m:dPr>
@@ -21234,7 +21240,7 @@
             </p:txBody>
           </p:sp>
         </mc:Choice>
-        <mc:Fallback xmlns="">
+        <mc:Fallback>
           <p:sp>
             <p:nvSpPr>
               <p:cNvPr id="3" name="Объект 2"/>
@@ -21249,7 +21255,7 @@
               <a:blipFill>
                 <a:blip r:embed="rId2"/>
                 <a:stretch>
-                  <a:fillRect l="-1043" t="-2101" r="-58"/>
+                  <a:fillRect l="-1043" t="-2101"/>
                 </a:stretch>
               </a:blipFill>
             </p:spPr>

</xml_diff>